<commit_message>
Update outline on slides (and outline PDF).
</commit_message>
<xml_diff>
--- a/Slides/QLS-MiCM_IntroToPython.pptx
+++ b/Slides/QLS-MiCM_IntroToPython.pptx
@@ -5,10 +5,10 @@
     <p:sldMasterId id="2147483660" r:id="rId1"/>
   </p:sldMasterIdLst>
   <p:notesMasterIdLst>
-    <p:notesMasterId r:id="rId10"/>
+    <p:notesMasterId r:id="rId11"/>
   </p:notesMasterIdLst>
   <p:handoutMasterIdLst>
-    <p:handoutMasterId r:id="rId11"/>
+    <p:handoutMasterId r:id="rId12"/>
   </p:handoutMasterIdLst>
   <p:sldIdLst>
     <p:sldId id="316" r:id="rId2"/>
@@ -16,9 +16,10 @@
     <p:sldId id="338" r:id="rId4"/>
     <p:sldId id="393" r:id="rId5"/>
     <p:sldId id="394" r:id="rId6"/>
-    <p:sldId id="329" r:id="rId7"/>
-    <p:sldId id="354" r:id="rId8"/>
-    <p:sldId id="340" r:id="rId9"/>
+    <p:sldId id="395" r:id="rId7"/>
+    <p:sldId id="329" r:id="rId8"/>
+    <p:sldId id="354" r:id="rId9"/>
+    <p:sldId id="340" r:id="rId10"/>
   </p:sldIdLst>
   <p:sldSz cx="9144000" cy="6858000" type="screen4x3"/>
   <p:notesSz cx="6858000" cy="9144000"/>
@@ -1006,7 +1007,13 @@
   <p:cSld>
     <p:spTree>
       <p:nvGrpSpPr>
-        <p:cNvPr id="1" name=""/>
+        <p:cNvPr id="1" name="">
+          <a:extLst>
+            <a:ext uri="{FF2B5EF4-FFF2-40B4-BE49-F238E27FC236}">
+              <a16:creationId xmlns:a16="http://schemas.microsoft.com/office/drawing/2014/main" id="{FA5AA192-BEA7-B98A-CB3D-1E8D83091C77}"/>
+            </a:ext>
+          </a:extLst>
+        </p:cNvPr>
         <p:cNvGrpSpPr/>
         <p:nvPr/>
       </p:nvGrpSpPr>
@@ -1020,7 +1027,13 @@
       </p:grpSpPr>
       <p:sp>
         <p:nvSpPr>
-          <p:cNvPr id="2" name="Slide Image Placeholder 1"/>
+          <p:cNvPr id="2" name="Slide Image Placeholder 1">
+            <a:extLst>
+              <a:ext uri="{FF2B5EF4-FFF2-40B4-BE49-F238E27FC236}">
+                <a16:creationId xmlns:a16="http://schemas.microsoft.com/office/drawing/2014/main" id="{5BF3734A-6956-EAFA-E4FC-D1CB6C151224}"/>
+              </a:ext>
+            </a:extLst>
+          </p:cNvPr>
           <p:cNvSpPr>
             <a:spLocks noGrp="1" noRot="1" noChangeAspect="1"/>
           </p:cNvSpPr>
@@ -1032,7 +1045,13 @@
       </p:sp>
       <p:sp>
         <p:nvSpPr>
-          <p:cNvPr id="3" name="Notes Placeholder 2"/>
+          <p:cNvPr id="3" name="Notes Placeholder 2">
+            <a:extLst>
+              <a:ext uri="{FF2B5EF4-FFF2-40B4-BE49-F238E27FC236}">
+                <a16:creationId xmlns:a16="http://schemas.microsoft.com/office/drawing/2014/main" id="{C9E06D55-BAE4-539C-7223-9DD310FF9227}"/>
+              </a:ext>
+            </a:extLst>
+          </p:cNvPr>
           <p:cNvSpPr>
             <a:spLocks noGrp="1"/>
           </p:cNvSpPr>
@@ -1045,13 +1064,19 @@
           <a:bodyPr/>
           <a:lstStyle/>
           <a:p>
-            <a:endParaRPr lang="en-US" dirty="0"/>
-          </a:p>
-        </p:txBody>
-      </p:sp>
-      <p:sp>
-        <p:nvSpPr>
-          <p:cNvPr id="4" name="Slide Number Placeholder 3"/>
+            <a:endParaRPr lang="en-CA"/>
+          </a:p>
+        </p:txBody>
+      </p:sp>
+      <p:sp>
+        <p:nvSpPr>
+          <p:cNvPr id="4" name="Slide Number Placeholder 3">
+            <a:extLst>
+              <a:ext uri="{FF2B5EF4-FFF2-40B4-BE49-F238E27FC236}">
+                <a16:creationId xmlns:a16="http://schemas.microsoft.com/office/drawing/2014/main" id="{F5E0CBFB-74A3-C17C-1630-0439B819E314}"/>
+              </a:ext>
+            </a:extLst>
+          </p:cNvPr>
           <p:cNvSpPr>
             <a:spLocks noGrp="1"/>
           </p:cNvSpPr>
@@ -1075,7 +1100,7 @@
     </p:spTree>
     <p:extLst>
       <p:ext uri="{BB962C8B-B14F-4D97-AF65-F5344CB8AC3E}">
-        <p14:creationId xmlns:p14="http://schemas.microsoft.com/office/powerpoint/2010/main" val="1865660032"/>
+        <p14:creationId xmlns:p14="http://schemas.microsoft.com/office/powerpoint/2010/main" val="2155653130"/>
       </p:ext>
     </p:extLst>
   </p:cSld>
@@ -1129,7 +1154,7 @@
           <a:bodyPr/>
           <a:lstStyle/>
           <a:p>
-            <a:endParaRPr lang="en-CA" dirty="0"/>
+            <a:endParaRPr lang="en-US" dirty="0"/>
           </a:p>
         </p:txBody>
       </p:sp>
@@ -1150,7 +1175,91 @@
           <a:p>
             <a:fld id="{DACBD60B-517C-4242-AE46-E1BD2D086542}" type="slidenum">
               <a:rPr lang="fr-FR" smtClean="0"/>
-              <a:t>8</a:t>
+              <a:t>7</a:t>
+            </a:fld>
+            <a:endParaRPr lang="fr-FR"/>
+          </a:p>
+        </p:txBody>
+      </p:sp>
+    </p:spTree>
+    <p:extLst>
+      <p:ext uri="{BB962C8B-B14F-4D97-AF65-F5344CB8AC3E}">
+        <p14:creationId xmlns:p14="http://schemas.microsoft.com/office/powerpoint/2010/main" val="1865660032"/>
+      </p:ext>
+    </p:extLst>
+  </p:cSld>
+  <p:clrMapOvr>
+    <a:masterClrMapping/>
+  </p:clrMapOvr>
+</p:notes>
+</file>
+
+<file path=ppt/notesSlides/notesSlide7.xml><?xml version="1.0" encoding="utf-8"?>
+<p:notes xmlns:a="http://schemas.openxmlformats.org/drawingml/2006/main" xmlns:r="http://schemas.openxmlformats.org/officeDocument/2006/relationships" xmlns:p="http://schemas.openxmlformats.org/presentationml/2006/main">
+  <p:cSld>
+    <p:spTree>
+      <p:nvGrpSpPr>
+        <p:cNvPr id="1" name=""/>
+        <p:cNvGrpSpPr/>
+        <p:nvPr/>
+      </p:nvGrpSpPr>
+      <p:grpSpPr>
+        <a:xfrm>
+          <a:off x="0" y="0"/>
+          <a:ext cx="0" cy="0"/>
+          <a:chOff x="0" y="0"/>
+          <a:chExt cx="0" cy="0"/>
+        </a:xfrm>
+      </p:grpSpPr>
+      <p:sp>
+        <p:nvSpPr>
+          <p:cNvPr id="2" name="Slide Image Placeholder 1"/>
+          <p:cNvSpPr>
+            <a:spLocks noGrp="1" noRot="1" noChangeAspect="1"/>
+          </p:cNvSpPr>
+          <p:nvPr>
+            <p:ph type="sldImg"/>
+          </p:nvPr>
+        </p:nvSpPr>
+        <p:spPr/>
+      </p:sp>
+      <p:sp>
+        <p:nvSpPr>
+          <p:cNvPr id="3" name="Notes Placeholder 2"/>
+          <p:cNvSpPr>
+            <a:spLocks noGrp="1"/>
+          </p:cNvSpPr>
+          <p:nvPr>
+            <p:ph type="body" idx="1"/>
+          </p:nvPr>
+        </p:nvSpPr>
+        <p:spPr/>
+        <p:txBody>
+          <a:bodyPr/>
+          <a:lstStyle/>
+          <a:p>
+            <a:endParaRPr lang="en-CA" dirty="0"/>
+          </a:p>
+        </p:txBody>
+      </p:sp>
+      <p:sp>
+        <p:nvSpPr>
+          <p:cNvPr id="4" name="Slide Number Placeholder 3"/>
+          <p:cNvSpPr>
+            <a:spLocks noGrp="1"/>
+          </p:cNvSpPr>
+          <p:nvPr>
+            <p:ph type="sldNum" sz="quarter" idx="5"/>
+          </p:nvPr>
+        </p:nvSpPr>
+        <p:spPr/>
+        <p:txBody>
+          <a:bodyPr/>
+          <a:lstStyle/>
+          <a:p>
+            <a:fld id="{DACBD60B-517C-4242-AE46-E1BD2D086542}" type="slidenum">
+              <a:rPr lang="fr-FR" smtClean="0"/>
+              <a:t>9</a:t>
             </a:fld>
             <a:endParaRPr lang="fr-FR"/>
           </a:p>
@@ -4046,8 +4155,8 @@
         </p:nvSpPr>
         <p:spPr>
           <a:xfrm>
-            <a:off x="533479" y="1032926"/>
-            <a:ext cx="7378018" cy="5686662"/>
+            <a:off x="533479" y="1758950"/>
+            <a:ext cx="7378018" cy="4108450"/>
           </a:xfrm>
         </p:spPr>
         <p:txBody>
@@ -4061,13 +4170,13 @@
               <a:buAutoNum type="arabicPeriod"/>
             </a:pPr>
             <a:r>
-              <a:rPr lang="en-US" sz="1400" b="1" dirty="0">
+              <a:rPr lang="en-US" sz="2000" b="1" dirty="0">
                 <a:latin typeface="Arial" panose="020B0604020202020204" pitchFamily="34" charset="0"/>
                 <a:cs typeface="Arial" panose="020B0604020202020204" pitchFamily="34" charset="0"/>
               </a:rPr>
               <a:t>Module 1 – Python Basics (1 hour)</a:t>
             </a:r>
-            <a:endParaRPr lang="en-CA" sz="1400" dirty="0">
+            <a:endParaRPr lang="en-CA" sz="2000" dirty="0">
               <a:latin typeface="Arial" panose="020B0604020202020204" pitchFamily="34" charset="0"/>
               <a:cs typeface="Arial" panose="020B0604020202020204" pitchFamily="34" charset="0"/>
             </a:endParaRPr>
@@ -4078,13 +4187,13 @@
               <a:buAutoNum type="alphaLcPeriod"/>
             </a:pPr>
             <a:r>
-              <a:rPr lang="en-US" sz="1400" dirty="0">
+              <a:rPr lang="en-US" sz="2000" dirty="0">
                 <a:latin typeface="Arial" panose="020B0604020202020204" pitchFamily="34" charset="0"/>
                 <a:cs typeface="Arial" panose="020B0604020202020204" pitchFamily="34" charset="0"/>
               </a:rPr>
               <a:t>Hello, World!</a:t>
             </a:r>
-            <a:endParaRPr lang="en-CA" sz="1400" dirty="0">
+            <a:endParaRPr lang="en-CA" sz="2000" dirty="0">
               <a:latin typeface="Arial" panose="020B0604020202020204" pitchFamily="34" charset="0"/>
               <a:cs typeface="Arial" panose="020B0604020202020204" pitchFamily="34" charset="0"/>
             </a:endParaRPr>
@@ -4095,13 +4204,13 @@
               <a:buAutoNum type="alphaLcPeriod"/>
             </a:pPr>
             <a:r>
-              <a:rPr lang="en-US" sz="1400" dirty="0">
+              <a:rPr lang="en-US" sz="2000" dirty="0">
                 <a:latin typeface="Arial" panose="020B0604020202020204" pitchFamily="34" charset="0"/>
                 <a:cs typeface="Arial" panose="020B0604020202020204" pitchFamily="34" charset="0"/>
               </a:rPr>
               <a:t>Variables</a:t>
             </a:r>
-            <a:endParaRPr lang="en-CA" sz="1400" dirty="0">
+            <a:endParaRPr lang="en-CA" sz="2000" dirty="0">
               <a:latin typeface="Arial" panose="020B0604020202020204" pitchFamily="34" charset="0"/>
               <a:cs typeface="Arial" panose="020B0604020202020204" pitchFamily="34" charset="0"/>
             </a:endParaRPr>
@@ -4112,13 +4221,13 @@
               <a:buAutoNum type="alphaLcPeriod"/>
             </a:pPr>
             <a:r>
-              <a:rPr lang="en-US" sz="1400" dirty="0">
+              <a:rPr lang="en-US" sz="2000" dirty="0">
                 <a:latin typeface="Arial" panose="020B0604020202020204" pitchFamily="34" charset="0"/>
                 <a:cs typeface="Arial" panose="020B0604020202020204" pitchFamily="34" charset="0"/>
               </a:rPr>
               <a:t>Numbers and Comparisons</a:t>
             </a:r>
-            <a:endParaRPr lang="en-CA" sz="1400" dirty="0">
+            <a:endParaRPr lang="en-CA" sz="2000" dirty="0">
               <a:latin typeface="Arial" panose="020B0604020202020204" pitchFamily="34" charset="0"/>
               <a:cs typeface="Arial" panose="020B0604020202020204" pitchFamily="34" charset="0"/>
             </a:endParaRPr>
@@ -4129,13 +4238,13 @@
               <a:buAutoNum type="alphaLcPeriod"/>
             </a:pPr>
             <a:r>
-              <a:rPr lang="en-US" sz="1400" dirty="0">
+              <a:rPr lang="en-US" sz="2000" dirty="0">
                 <a:latin typeface="Arial" panose="020B0604020202020204" pitchFamily="34" charset="0"/>
                 <a:cs typeface="Arial" panose="020B0604020202020204" pitchFamily="34" charset="0"/>
               </a:rPr>
               <a:t>Intro to strings</a:t>
             </a:r>
-            <a:endParaRPr lang="en-CA" sz="1400" dirty="0">
+            <a:endParaRPr lang="en-CA" sz="2000" dirty="0">
               <a:latin typeface="Arial" panose="020B0604020202020204" pitchFamily="34" charset="0"/>
               <a:cs typeface="Arial" panose="020B0604020202020204" pitchFamily="34" charset="0"/>
             </a:endParaRPr>
@@ -4146,13 +4255,13 @@
               <a:buAutoNum type="alphaLcPeriod"/>
             </a:pPr>
             <a:r>
-              <a:rPr lang="en-US" sz="1400" b="1" dirty="0">
+              <a:rPr lang="en-US" sz="2000" b="1" dirty="0">
                 <a:latin typeface="Arial" panose="020B0604020202020204" pitchFamily="34" charset="0"/>
                 <a:cs typeface="Arial" panose="020B0604020202020204" pitchFamily="34" charset="0"/>
               </a:rPr>
               <a:t>Exercise</a:t>
             </a:r>
-            <a:endParaRPr lang="en-CA" sz="1400" b="1" dirty="0">
+            <a:endParaRPr lang="en-CA" sz="2000" b="1" dirty="0">
               <a:latin typeface="Arial" panose="020B0604020202020204" pitchFamily="34" charset="0"/>
               <a:cs typeface="Arial" panose="020B0604020202020204" pitchFamily="34" charset="0"/>
             </a:endParaRPr>
@@ -4163,13 +4272,13 @@
               <a:buAutoNum type="arabicPeriod"/>
             </a:pPr>
             <a:r>
-              <a:rPr lang="en-US" sz="1400" b="1" dirty="0">
+              <a:rPr lang="en-US" sz="2000" b="1" dirty="0">
                 <a:latin typeface="Arial" panose="020B0604020202020204" pitchFamily="34" charset="0"/>
                 <a:cs typeface="Arial" panose="020B0604020202020204" pitchFamily="34" charset="0"/>
               </a:rPr>
               <a:t>Module 2 – Collections (1 hour)</a:t>
             </a:r>
-            <a:endParaRPr lang="en-CA" sz="1400" dirty="0">
+            <a:endParaRPr lang="en-CA" sz="2000" dirty="0">
               <a:latin typeface="Arial" panose="020B0604020202020204" pitchFamily="34" charset="0"/>
               <a:cs typeface="Arial" panose="020B0604020202020204" pitchFamily="34" charset="0"/>
             </a:endParaRPr>
@@ -4180,13 +4289,13 @@
               <a:buAutoNum type="alphaLcPeriod"/>
             </a:pPr>
             <a:r>
-              <a:rPr lang="en-US" sz="1400" dirty="0">
+              <a:rPr lang="en-US" sz="2000" dirty="0">
                 <a:latin typeface="Arial" panose="020B0604020202020204" pitchFamily="34" charset="0"/>
                 <a:cs typeface="Arial" panose="020B0604020202020204" pitchFamily="34" charset="0"/>
               </a:rPr>
               <a:t>Lists and List Methods</a:t>
             </a:r>
-            <a:endParaRPr lang="en-CA" sz="1400" dirty="0">
+            <a:endParaRPr lang="en-CA" sz="2000" dirty="0">
               <a:latin typeface="Arial" panose="020B0604020202020204" pitchFamily="34" charset="0"/>
               <a:cs typeface="Arial" panose="020B0604020202020204" pitchFamily="34" charset="0"/>
             </a:endParaRPr>
@@ -4197,13 +4306,13 @@
               <a:buAutoNum type="alphaLcPeriod"/>
             </a:pPr>
             <a:r>
-              <a:rPr lang="en-US" sz="1400" dirty="0">
+              <a:rPr lang="en-US" sz="2000" dirty="0">
                 <a:latin typeface="Arial" panose="020B0604020202020204" pitchFamily="34" charset="0"/>
                 <a:cs typeface="Arial" panose="020B0604020202020204" pitchFamily="34" charset="0"/>
               </a:rPr>
               <a:t>Tuples</a:t>
             </a:r>
-            <a:endParaRPr lang="en-CA" sz="1400" dirty="0">
+            <a:endParaRPr lang="en-CA" sz="2000" dirty="0">
               <a:latin typeface="Arial" panose="020B0604020202020204" pitchFamily="34" charset="0"/>
               <a:cs typeface="Arial" panose="020B0604020202020204" pitchFamily="34" charset="0"/>
             </a:endParaRPr>
@@ -4214,13 +4323,13 @@
               <a:buAutoNum type="alphaLcPeriod"/>
             </a:pPr>
             <a:r>
-              <a:rPr lang="en-US" sz="1400" dirty="0">
+              <a:rPr lang="en-US" sz="2000" dirty="0">
                 <a:latin typeface="Arial" panose="020B0604020202020204" pitchFamily="34" charset="0"/>
                 <a:cs typeface="Arial" panose="020B0604020202020204" pitchFamily="34" charset="0"/>
               </a:rPr>
               <a:t>Dictionaries</a:t>
             </a:r>
-            <a:endParaRPr lang="en-CA" sz="1400" dirty="0">
+            <a:endParaRPr lang="en-CA" sz="2000" dirty="0">
               <a:latin typeface="Arial" panose="020B0604020202020204" pitchFamily="34" charset="0"/>
               <a:cs typeface="Arial" panose="020B0604020202020204" pitchFamily="34" charset="0"/>
             </a:endParaRPr>
@@ -4231,183 +4340,13 @@
               <a:buAutoNum type="alphaLcPeriod"/>
             </a:pPr>
             <a:r>
-              <a:rPr lang="en-US" sz="1400" b="1" dirty="0">
+              <a:rPr lang="en-US" sz="2000" b="1" dirty="0">
                 <a:latin typeface="Arial" panose="020B0604020202020204" pitchFamily="34" charset="0"/>
                 <a:cs typeface="Arial" panose="020B0604020202020204" pitchFamily="34" charset="0"/>
               </a:rPr>
               <a:t>Exercise</a:t>
             </a:r>
-            <a:endParaRPr lang="en-CA" sz="1400" b="1" dirty="0">
-              <a:latin typeface="Arial" panose="020B0604020202020204" pitchFamily="34" charset="0"/>
-              <a:cs typeface="Arial" panose="020B0604020202020204" pitchFamily="34" charset="0"/>
-            </a:endParaRPr>
-          </a:p>
-          <a:p>
-            <a:pPr marL="342900" lvl="0" indent="-342900">
-              <a:buFont typeface="+mj-lt"/>
-              <a:buAutoNum type="arabicPeriod"/>
-            </a:pPr>
-            <a:r>
-              <a:rPr lang="en-US" sz="1400" b="1" dirty="0">
-                <a:latin typeface="Arial" panose="020B0604020202020204" pitchFamily="34" charset="0"/>
-                <a:cs typeface="Arial" panose="020B0604020202020204" pitchFamily="34" charset="0"/>
-              </a:rPr>
-              <a:t>Module 3 - Intro to Control Flow and Loops (40 minutes)</a:t>
-            </a:r>
-            <a:endParaRPr lang="en-CA" sz="1400" dirty="0">
-              <a:latin typeface="Arial" panose="020B0604020202020204" pitchFamily="34" charset="0"/>
-              <a:cs typeface="Arial" panose="020B0604020202020204" pitchFamily="34" charset="0"/>
-            </a:endParaRPr>
-          </a:p>
-          <a:p>
-            <a:pPr marL="799988" lvl="1" indent="-342900">
-              <a:buFont typeface="+mj-lt"/>
-              <a:buAutoNum type="alphaLcPeriod"/>
-            </a:pPr>
-            <a:r>
-              <a:rPr lang="en-US" sz="1400" dirty="0">
-                <a:latin typeface="Arial" panose="020B0604020202020204" pitchFamily="34" charset="0"/>
-                <a:cs typeface="Arial" panose="020B0604020202020204" pitchFamily="34" charset="0"/>
-              </a:rPr>
-              <a:t>Control Flow: the if statement</a:t>
-            </a:r>
-            <a:endParaRPr lang="en-CA" sz="1400" dirty="0">
-              <a:latin typeface="Arial" panose="020B0604020202020204" pitchFamily="34" charset="0"/>
-              <a:cs typeface="Arial" panose="020B0604020202020204" pitchFamily="34" charset="0"/>
-            </a:endParaRPr>
-          </a:p>
-          <a:p>
-            <a:pPr marL="799988" lvl="1" indent="-342900">
-              <a:buFont typeface="+mj-lt"/>
-              <a:buAutoNum type="alphaLcPeriod"/>
-            </a:pPr>
-            <a:r>
-              <a:rPr lang="en-US" sz="1400" dirty="0">
-                <a:latin typeface="Arial" panose="020B0604020202020204" pitchFamily="34" charset="0"/>
-                <a:cs typeface="Arial" panose="020B0604020202020204" pitchFamily="34" charset="0"/>
-              </a:rPr>
-              <a:t>Loops</a:t>
-            </a:r>
-            <a:endParaRPr lang="en-CA" sz="1400" dirty="0">
-              <a:latin typeface="Arial" panose="020B0604020202020204" pitchFamily="34" charset="0"/>
-              <a:cs typeface="Arial" panose="020B0604020202020204" pitchFamily="34" charset="0"/>
-            </a:endParaRPr>
-          </a:p>
-          <a:p>
-            <a:pPr marL="799988" lvl="1" indent="-342900">
-              <a:buFont typeface="+mj-lt"/>
-              <a:buAutoNum type="alphaLcPeriod"/>
-            </a:pPr>
-            <a:r>
-              <a:rPr lang="en-US" sz="1400" b="1" dirty="0">
-                <a:latin typeface="Arial" panose="020B0604020202020204" pitchFamily="34" charset="0"/>
-                <a:cs typeface="Arial" panose="020B0604020202020204" pitchFamily="34" charset="0"/>
-              </a:rPr>
-              <a:t>Exercise</a:t>
-            </a:r>
-            <a:endParaRPr lang="en-CA" sz="1400" b="1" dirty="0">
-              <a:latin typeface="Arial" panose="020B0604020202020204" pitchFamily="34" charset="0"/>
-              <a:cs typeface="Arial" panose="020B0604020202020204" pitchFamily="34" charset="0"/>
-            </a:endParaRPr>
-          </a:p>
-          <a:p>
-            <a:pPr marL="342900" lvl="0" indent="-342900">
-              <a:buFont typeface="+mj-lt"/>
-              <a:buAutoNum type="arabicPeriod"/>
-            </a:pPr>
-            <a:r>
-              <a:rPr lang="en-US" sz="1400" b="1" dirty="0">
-                <a:latin typeface="Arial" panose="020B0604020202020204" pitchFamily="34" charset="0"/>
-                <a:cs typeface="Arial" panose="020B0604020202020204" pitchFamily="34" charset="0"/>
-              </a:rPr>
-              <a:t>Module 4 – Introduction to Functions (30 minutes)</a:t>
-            </a:r>
-            <a:endParaRPr lang="en-CA" sz="1400" dirty="0">
-              <a:latin typeface="Arial" panose="020B0604020202020204" pitchFamily="34" charset="0"/>
-              <a:cs typeface="Arial" panose="020B0604020202020204" pitchFamily="34" charset="0"/>
-            </a:endParaRPr>
-          </a:p>
-          <a:p>
-            <a:pPr marL="799988" lvl="1" indent="-342900">
-              <a:buFont typeface="+mj-lt"/>
-              <a:buAutoNum type="alphaLcPeriod"/>
-            </a:pPr>
-            <a:r>
-              <a:rPr lang="en-US" sz="1400" dirty="0">
-                <a:latin typeface="Arial" panose="020B0604020202020204" pitchFamily="34" charset="0"/>
-                <a:cs typeface="Arial" panose="020B0604020202020204" pitchFamily="34" charset="0"/>
-              </a:rPr>
-              <a:t>Function Overview</a:t>
-            </a:r>
-            <a:endParaRPr lang="en-CA" sz="1400" dirty="0">
-              <a:latin typeface="Arial" panose="020B0604020202020204" pitchFamily="34" charset="0"/>
-              <a:cs typeface="Arial" panose="020B0604020202020204" pitchFamily="34" charset="0"/>
-            </a:endParaRPr>
-          </a:p>
-          <a:p>
-            <a:pPr marL="799988" lvl="1" indent="-342900">
-              <a:buFont typeface="+mj-lt"/>
-              <a:buAutoNum type="alphaLcPeriod"/>
-            </a:pPr>
-            <a:r>
-              <a:rPr lang="en-US" sz="1400" dirty="0">
-                <a:latin typeface="Arial" panose="020B0604020202020204" pitchFamily="34" charset="0"/>
-                <a:cs typeface="Arial" panose="020B0604020202020204" pitchFamily="34" charset="0"/>
-              </a:rPr>
-              <a:t>Writing Custom Functions</a:t>
-            </a:r>
-            <a:endParaRPr lang="en-CA" sz="1400" dirty="0">
-              <a:latin typeface="Arial" panose="020B0604020202020204" pitchFamily="34" charset="0"/>
-              <a:cs typeface="Arial" panose="020B0604020202020204" pitchFamily="34" charset="0"/>
-            </a:endParaRPr>
-          </a:p>
-          <a:p>
-            <a:pPr marL="799988" lvl="1" indent="-342900">
-              <a:buFont typeface="+mj-lt"/>
-              <a:buAutoNum type="alphaLcPeriod"/>
-            </a:pPr>
-            <a:r>
-              <a:rPr lang="en-US" sz="1400" dirty="0">
-                <a:latin typeface="Arial" panose="020B0604020202020204" pitchFamily="34" charset="0"/>
-                <a:cs typeface="Arial" panose="020B0604020202020204" pitchFamily="34" charset="0"/>
-              </a:rPr>
-              <a:t>Documenting Functions</a:t>
-            </a:r>
-            <a:endParaRPr lang="en-CA" sz="1400" dirty="0">
-              <a:latin typeface="Arial" panose="020B0604020202020204" pitchFamily="34" charset="0"/>
-              <a:cs typeface="Arial" panose="020B0604020202020204" pitchFamily="34" charset="0"/>
-            </a:endParaRPr>
-          </a:p>
-          <a:p>
-            <a:pPr marL="799988" lvl="1" indent="-342900">
-              <a:buFont typeface="+mj-lt"/>
-              <a:buAutoNum type="alphaLcPeriod"/>
-            </a:pPr>
-            <a:r>
-              <a:rPr lang="en-US" sz="1400" b="1" dirty="0">
-                <a:latin typeface="Arial" panose="020B0604020202020204" pitchFamily="34" charset="0"/>
-                <a:cs typeface="Arial" panose="020B0604020202020204" pitchFamily="34" charset="0"/>
-              </a:rPr>
-              <a:t>Exercise</a:t>
-            </a:r>
-            <a:endParaRPr lang="en-CA" sz="1400" dirty="0">
-              <a:latin typeface="Arial" panose="020B0604020202020204" pitchFamily="34" charset="0"/>
-              <a:cs typeface="Arial" panose="020B0604020202020204" pitchFamily="34" charset="0"/>
-            </a:endParaRPr>
-          </a:p>
-          <a:p>
-            <a:pPr marL="342900" lvl="0" indent="-342900">
-              <a:buFont typeface="+mj-lt"/>
-              <a:buAutoNum type="arabicPeriod"/>
-            </a:pPr>
-            <a:r>
-              <a:rPr lang="en-US" sz="1400" b="1" dirty="0">
-                <a:latin typeface="Arial" panose="020B0604020202020204" pitchFamily="34" charset="0"/>
-                <a:cs typeface="Arial" panose="020B0604020202020204" pitchFamily="34" charset="0"/>
-              </a:rPr>
-              <a:t>Module 5 – Where to go from here (10 minutes)</a:t>
-            </a:r>
-            <a:endParaRPr lang="en-CA" sz="1400" dirty="0">
+            <a:endParaRPr lang="en-CA" sz="2000" dirty="0">
               <a:latin typeface="Arial" panose="020B0604020202020204" pitchFamily="34" charset="0"/>
               <a:cs typeface="Arial" panose="020B0604020202020204" pitchFamily="34" charset="0"/>
             </a:endParaRPr>
@@ -4428,6 +4367,294 @@
 </file>
 
 <file path=ppt/slides/slide6.xml><?xml version="1.0" encoding="utf-8"?>
+<p:sld xmlns:a="http://schemas.openxmlformats.org/drawingml/2006/main" xmlns:r="http://schemas.openxmlformats.org/officeDocument/2006/relationships" xmlns:p="http://schemas.openxmlformats.org/presentationml/2006/main">
+  <p:cSld>
+    <p:spTree>
+      <p:nvGrpSpPr>
+        <p:cNvPr id="1" name="">
+          <a:extLst>
+            <a:ext uri="{FF2B5EF4-FFF2-40B4-BE49-F238E27FC236}">
+              <a16:creationId xmlns:a16="http://schemas.microsoft.com/office/drawing/2014/main" id="{44813104-6B5D-759E-C5C3-A5D872416A47}"/>
+            </a:ext>
+          </a:extLst>
+        </p:cNvPr>
+        <p:cNvGrpSpPr/>
+        <p:nvPr/>
+      </p:nvGrpSpPr>
+      <p:grpSpPr>
+        <a:xfrm>
+          <a:off x="0" y="0"/>
+          <a:ext cx="0" cy="0"/>
+          <a:chOff x="0" y="0"/>
+          <a:chExt cx="0" cy="0"/>
+        </a:xfrm>
+      </p:grpSpPr>
+      <p:sp>
+        <p:nvSpPr>
+          <p:cNvPr id="2" name="Title 1">
+            <a:extLst>
+              <a:ext uri="{FF2B5EF4-FFF2-40B4-BE49-F238E27FC236}">
+                <a16:creationId xmlns:a16="http://schemas.microsoft.com/office/drawing/2014/main" id="{3C3D0124-BE13-8F03-D9FE-DB39FDCFFE8D}"/>
+              </a:ext>
+            </a:extLst>
+          </p:cNvPr>
+          <p:cNvSpPr>
+            <a:spLocks noGrp="1"/>
+          </p:cNvSpPr>
+          <p:nvPr>
+            <p:ph type="title"/>
+          </p:nvPr>
+        </p:nvSpPr>
+        <p:spPr>
+          <a:xfrm>
+            <a:off x="279138" y="138412"/>
+            <a:ext cx="7886700" cy="1325565"/>
+          </a:xfrm>
+        </p:spPr>
+        <p:txBody>
+          <a:bodyPr/>
+          <a:lstStyle/>
+          <a:p>
+            <a:r>
+              <a:rPr lang="en-US" sz="4400" dirty="0">
+                <a:latin typeface="Helvetica"/>
+                <a:cs typeface="Helvetica"/>
+              </a:rPr>
+              <a:t>Outline</a:t>
+            </a:r>
+            <a:endParaRPr lang="en-US" sz="4400" dirty="0">
+              <a:latin typeface="Helvetica" pitchFamily="2" charset="0"/>
+              <a:cs typeface="Helvetica"/>
+            </a:endParaRPr>
+          </a:p>
+        </p:txBody>
+      </p:sp>
+      <p:sp>
+        <p:nvSpPr>
+          <p:cNvPr id="3" name="Content Placeholder 2">
+            <a:extLst>
+              <a:ext uri="{FF2B5EF4-FFF2-40B4-BE49-F238E27FC236}">
+                <a16:creationId xmlns:a16="http://schemas.microsoft.com/office/drawing/2014/main" id="{FF0BEBFE-215C-C7FA-5E66-2276680B6E4B}"/>
+              </a:ext>
+            </a:extLst>
+          </p:cNvPr>
+          <p:cNvSpPr>
+            <a:spLocks noGrp="1"/>
+          </p:cNvSpPr>
+          <p:nvPr>
+            <p:ph idx="1"/>
+          </p:nvPr>
+        </p:nvSpPr>
+        <p:spPr>
+          <a:xfrm>
+            <a:off x="533479" y="1593850"/>
+            <a:ext cx="7378018" cy="4121150"/>
+          </a:xfrm>
+        </p:spPr>
+        <p:txBody>
+          <a:bodyPr vert="horz" lIns="91440" tIns="45720" rIns="91440" bIns="45720" rtlCol="0" anchor="t">
+            <a:noAutofit/>
+          </a:bodyPr>
+          <a:lstStyle/>
+          <a:p>
+            <a:pPr marL="457200" lvl="0" indent="-457200">
+              <a:buFont typeface="+mj-lt"/>
+              <a:buAutoNum type="arabicPeriod" startAt="3"/>
+            </a:pPr>
+            <a:r>
+              <a:rPr lang="en-US" sz="2000" b="1" dirty="0">
+                <a:latin typeface="Arial" panose="020B0604020202020204" pitchFamily="34" charset="0"/>
+                <a:cs typeface="Arial" panose="020B0604020202020204" pitchFamily="34" charset="0"/>
+              </a:rPr>
+              <a:t>Module 3 - Intro to Control Flow and Loops (40 minutes)</a:t>
+            </a:r>
+            <a:endParaRPr lang="en-CA" sz="2000" dirty="0">
+              <a:latin typeface="Arial" panose="020B0604020202020204" pitchFamily="34" charset="0"/>
+              <a:cs typeface="Arial" panose="020B0604020202020204" pitchFamily="34" charset="0"/>
+            </a:endParaRPr>
+          </a:p>
+          <a:p>
+            <a:pPr marL="799988" lvl="1" indent="-342900">
+              <a:buFont typeface="+mj-lt"/>
+              <a:buAutoNum type="alphaLcPeriod"/>
+            </a:pPr>
+            <a:r>
+              <a:rPr lang="en-US" sz="2000" dirty="0">
+                <a:latin typeface="Arial" panose="020B0604020202020204" pitchFamily="34" charset="0"/>
+                <a:cs typeface="Arial" panose="020B0604020202020204" pitchFamily="34" charset="0"/>
+              </a:rPr>
+              <a:t>Control Flow: the if statement</a:t>
+            </a:r>
+            <a:endParaRPr lang="en-CA" sz="2000" dirty="0">
+              <a:latin typeface="Arial" panose="020B0604020202020204" pitchFamily="34" charset="0"/>
+              <a:cs typeface="Arial" panose="020B0604020202020204" pitchFamily="34" charset="0"/>
+            </a:endParaRPr>
+          </a:p>
+          <a:p>
+            <a:pPr marL="799988" lvl="1" indent="-342900">
+              <a:buFont typeface="+mj-lt"/>
+              <a:buAutoNum type="alphaLcPeriod"/>
+            </a:pPr>
+            <a:r>
+              <a:rPr lang="en-US" sz="2000" dirty="0">
+                <a:latin typeface="Arial" panose="020B0604020202020204" pitchFamily="34" charset="0"/>
+                <a:cs typeface="Arial" panose="020B0604020202020204" pitchFamily="34" charset="0"/>
+              </a:rPr>
+              <a:t>Loops</a:t>
+            </a:r>
+            <a:endParaRPr lang="en-CA" sz="2000" dirty="0">
+              <a:latin typeface="Arial" panose="020B0604020202020204" pitchFamily="34" charset="0"/>
+              <a:cs typeface="Arial" panose="020B0604020202020204" pitchFamily="34" charset="0"/>
+            </a:endParaRPr>
+          </a:p>
+          <a:p>
+            <a:pPr marL="799988" lvl="1" indent="-342900">
+              <a:buFont typeface="+mj-lt"/>
+              <a:buAutoNum type="alphaLcPeriod"/>
+            </a:pPr>
+            <a:r>
+              <a:rPr lang="en-US" sz="2000" b="1" dirty="0">
+                <a:latin typeface="Arial" panose="020B0604020202020204" pitchFamily="34" charset="0"/>
+                <a:cs typeface="Arial" panose="020B0604020202020204" pitchFamily="34" charset="0"/>
+              </a:rPr>
+              <a:t>Exercise</a:t>
+            </a:r>
+            <a:endParaRPr lang="en-CA" sz="2000" b="1" dirty="0">
+              <a:latin typeface="Arial" panose="020B0604020202020204" pitchFamily="34" charset="0"/>
+              <a:cs typeface="Arial" panose="020B0604020202020204" pitchFamily="34" charset="0"/>
+            </a:endParaRPr>
+          </a:p>
+          <a:p>
+            <a:pPr marL="342900" lvl="0" indent="-342900">
+              <a:buFont typeface="+mj-lt"/>
+              <a:buAutoNum type="arabicPeriod" startAt="3"/>
+            </a:pPr>
+            <a:r>
+              <a:rPr lang="en-US" sz="2000" b="1" dirty="0">
+                <a:latin typeface="Arial" panose="020B0604020202020204" pitchFamily="34" charset="0"/>
+                <a:cs typeface="Arial" panose="020B0604020202020204" pitchFamily="34" charset="0"/>
+              </a:rPr>
+              <a:t>Module 4 – Introduction to Functions (30 minutes)</a:t>
+            </a:r>
+            <a:endParaRPr lang="en-CA" sz="2000" dirty="0">
+              <a:latin typeface="Arial" panose="020B0604020202020204" pitchFamily="34" charset="0"/>
+              <a:cs typeface="Arial" panose="020B0604020202020204" pitchFamily="34" charset="0"/>
+            </a:endParaRPr>
+          </a:p>
+          <a:p>
+            <a:pPr marL="799988" lvl="1" indent="-342900">
+              <a:buFont typeface="+mj-lt"/>
+              <a:buAutoNum type="alphaLcPeriod"/>
+            </a:pPr>
+            <a:r>
+              <a:rPr lang="en-US" sz="2000" dirty="0">
+                <a:latin typeface="Arial" panose="020B0604020202020204" pitchFamily="34" charset="0"/>
+                <a:cs typeface="Arial" panose="020B0604020202020204" pitchFamily="34" charset="0"/>
+              </a:rPr>
+              <a:t>Function Overview</a:t>
+            </a:r>
+            <a:endParaRPr lang="en-CA" sz="2000" dirty="0">
+              <a:latin typeface="Arial" panose="020B0604020202020204" pitchFamily="34" charset="0"/>
+              <a:cs typeface="Arial" panose="020B0604020202020204" pitchFamily="34" charset="0"/>
+            </a:endParaRPr>
+          </a:p>
+          <a:p>
+            <a:pPr marL="799988" lvl="1" indent="-342900">
+              <a:buFont typeface="+mj-lt"/>
+              <a:buAutoNum type="alphaLcPeriod"/>
+            </a:pPr>
+            <a:r>
+              <a:rPr lang="en-US" sz="2000" dirty="0">
+                <a:latin typeface="Arial" panose="020B0604020202020204" pitchFamily="34" charset="0"/>
+                <a:cs typeface="Arial" panose="020B0604020202020204" pitchFamily="34" charset="0"/>
+              </a:rPr>
+              <a:t>Writing Custom Functions</a:t>
+            </a:r>
+            <a:endParaRPr lang="en-CA" sz="2000" dirty="0">
+              <a:latin typeface="Arial" panose="020B0604020202020204" pitchFamily="34" charset="0"/>
+              <a:cs typeface="Arial" panose="020B0604020202020204" pitchFamily="34" charset="0"/>
+            </a:endParaRPr>
+          </a:p>
+          <a:p>
+            <a:pPr marL="799988" lvl="1" indent="-342900">
+              <a:buFont typeface="+mj-lt"/>
+              <a:buAutoNum type="alphaLcPeriod"/>
+            </a:pPr>
+            <a:r>
+              <a:rPr lang="en-US" sz="2000" dirty="0">
+                <a:latin typeface="Arial" panose="020B0604020202020204" pitchFamily="34" charset="0"/>
+                <a:cs typeface="Arial" panose="020B0604020202020204" pitchFamily="34" charset="0"/>
+              </a:rPr>
+              <a:t>Documenting Functions</a:t>
+            </a:r>
+          </a:p>
+          <a:p>
+            <a:pPr marL="799988" lvl="1" indent="-342900">
+              <a:buFont typeface="+mj-lt"/>
+              <a:buAutoNum type="alphaLcPeriod"/>
+            </a:pPr>
+            <a:r>
+              <a:rPr lang="en-US" sz="2000" dirty="0">
+                <a:latin typeface="Arial" panose="020B0604020202020204" pitchFamily="34" charset="0"/>
+                <a:cs typeface="Arial" panose="020B0604020202020204" pitchFamily="34" charset="0"/>
+              </a:rPr>
+              <a:t>To script, or not to script?</a:t>
+            </a:r>
+            <a:endParaRPr lang="en-CA" sz="2000" dirty="0">
+              <a:latin typeface="Arial" panose="020B0604020202020204" pitchFamily="34" charset="0"/>
+              <a:cs typeface="Arial" panose="020B0604020202020204" pitchFamily="34" charset="0"/>
+            </a:endParaRPr>
+          </a:p>
+          <a:p>
+            <a:pPr marL="799988" lvl="1" indent="-342900">
+              <a:buFont typeface="+mj-lt"/>
+              <a:buAutoNum type="alphaLcPeriod"/>
+            </a:pPr>
+            <a:r>
+              <a:rPr lang="en-US" sz="2000" b="1" dirty="0">
+                <a:latin typeface="Arial" panose="020B0604020202020204" pitchFamily="34" charset="0"/>
+                <a:cs typeface="Arial" panose="020B0604020202020204" pitchFamily="34" charset="0"/>
+              </a:rPr>
+              <a:t>Exercise</a:t>
+            </a:r>
+            <a:endParaRPr lang="en-CA" sz="2000" dirty="0">
+              <a:latin typeface="Arial" panose="020B0604020202020204" pitchFamily="34" charset="0"/>
+              <a:cs typeface="Arial" panose="020B0604020202020204" pitchFamily="34" charset="0"/>
+            </a:endParaRPr>
+          </a:p>
+          <a:p>
+            <a:pPr marL="342900" lvl="0" indent="-342900">
+              <a:buFont typeface="+mj-lt"/>
+              <a:buAutoNum type="arabicPeriod" startAt="3"/>
+            </a:pPr>
+            <a:r>
+              <a:rPr lang="en-US" sz="2000" b="1" dirty="0">
+                <a:latin typeface="Arial" panose="020B0604020202020204" pitchFamily="34" charset="0"/>
+                <a:cs typeface="Arial" panose="020B0604020202020204" pitchFamily="34" charset="0"/>
+              </a:rPr>
+              <a:t>Module 5 – Where to go from here (10 minutes)</a:t>
+            </a:r>
+            <a:endParaRPr lang="en-CA" sz="2000" dirty="0">
+              <a:latin typeface="Arial" panose="020B0604020202020204" pitchFamily="34" charset="0"/>
+              <a:cs typeface="Arial" panose="020B0604020202020204" pitchFamily="34" charset="0"/>
+            </a:endParaRPr>
+          </a:p>
+        </p:txBody>
+      </p:sp>
+    </p:spTree>
+    <p:extLst>
+      <p:ext uri="{BB962C8B-B14F-4D97-AF65-F5344CB8AC3E}">
+        <p14:creationId xmlns:p14="http://schemas.microsoft.com/office/powerpoint/2010/main" val="672099878"/>
+      </p:ext>
+    </p:extLst>
+  </p:cSld>
+  <p:clrMapOvr>
+    <a:masterClrMapping/>
+  </p:clrMapOvr>
+</p:sld>
+</file>
+
+<file path=ppt/slides/slide7.xml><?xml version="1.0" encoding="utf-8"?>
 <p:sld xmlns:a="http://schemas.openxmlformats.org/drawingml/2006/main" xmlns:r="http://schemas.openxmlformats.org/officeDocument/2006/relationships" xmlns:p="http://schemas.openxmlformats.org/presentationml/2006/main">
   <p:cSld>
     <p:spTree>
@@ -4634,7 +4861,7 @@
 </p:sld>
 </file>
 
-<file path=ppt/slides/slide7.xml><?xml version="1.0" encoding="utf-8"?>
+<file path=ppt/slides/slide8.xml><?xml version="1.0" encoding="utf-8"?>
 <p:sld xmlns:a="http://schemas.openxmlformats.org/drawingml/2006/main" xmlns:r="http://schemas.openxmlformats.org/officeDocument/2006/relationships" xmlns:p="http://schemas.openxmlformats.org/presentationml/2006/main">
   <p:cSld>
     <p:spTree>
@@ -5095,7 +5322,7 @@
 </p:sld>
 </file>
 
-<file path=ppt/slides/slide8.xml><?xml version="1.0" encoding="utf-8"?>
+<file path=ppt/slides/slide9.xml><?xml version="1.0" encoding="utf-8"?>
 <p:sld xmlns:a="http://schemas.openxmlformats.org/drawingml/2006/main" xmlns:r="http://schemas.openxmlformats.org/officeDocument/2006/relationships" xmlns:p="http://schemas.openxmlformats.org/presentationml/2006/main">
   <p:cSld>
     <p:spTree>

</xml_diff>